<commit_message>
updated Module4 - fixed typos
</commit_message>
<xml_diff>
--- a/Slides/Module 04 Interaction-Level Design Patterns.pptx
+++ b/Slides/Module 04 Interaction-Level Design Patterns.pptx
@@ -1035,7 +1035,7 @@
           <a:p>
             <a:fld id="{7C7E5181-6CF5-45F7-A87A-E0E0B1FD7549}" type="datetimeFigureOut">
               <a:rPr lang="en-US" smtClean="0"/>
-              <a:t>9/13/2022</a:t>
+              <a:t>9/17/2022</a:t>
             </a:fld>
             <a:endParaRPr lang="en-US"/>
           </a:p>
@@ -2371,6 +2371,36 @@
               <a:rPr lang="en-US" dirty="0"/>
               <a:t>Note that we specify that the listeners/consumers/observers are notified by sending them a notify message with the current time.   If we didn’t specify this, we wouldn’t know how to write a listener. </a:t>
             </a:r>
+            <a:br>
+              <a:rPr lang="en-US" dirty="0"/>
+            </a:br>
+            <a:endParaRPr lang="en-US" dirty="0"/>
+          </a:p>
+          <a:p>
+            <a:pPr marL="0" marR="0" lvl="0" indent="0" algn="l" defTabSz="914400" rtl="0" eaLnBrk="1" fontAlgn="auto" latinLnBrk="0" hangingPunct="1">
+              <a:lnSpc>
+                <a:spcPct val="100000"/>
+              </a:lnSpc>
+              <a:spcBef>
+                <a:spcPts val="0"/>
+              </a:spcBef>
+              <a:spcAft>
+                <a:spcPts val="0"/>
+              </a:spcAft>
+              <a:buClrTx/>
+              <a:buSzTx/>
+              <a:buFontTx/>
+              <a:buNone/>
+              <a:tabLst/>
+              <a:defRPr/>
+            </a:pPr>
+            <a:r>
+              <a:rPr lang="en-US"/>
+              <a:t>Notice that we no longer have a getter that was previously used by consumer.</a:t>
+            </a:r>
+          </a:p>
+          <a:p>
+            <a:endParaRPr lang="en-US" dirty="0"/>
           </a:p>
           <a:p>
             <a:endParaRPr lang="en-US" dirty="0"/>
@@ -6491,7 +6521,7 @@
           <a:p>
             <a:fld id="{5D2A64DE-480B-420F-9649-4F8E696E08E0}" type="datetime1">
               <a:rPr lang="en-US" smtClean="0"/>
-              <a:t>9/13/2022</a:t>
+              <a:t>9/17/2022</a:t>
             </a:fld>
             <a:endParaRPr lang="en-US"/>
           </a:p>
@@ -6815,7 +6845,7 @@
           <a:p>
             <a:fld id="{EA476A42-A091-4468-A075-64A31BE59948}" type="datetime1">
               <a:rPr lang="en-US" smtClean="0"/>
-              <a:t>9/13/2022</a:t>
+              <a:t>9/17/2022</a:t>
             </a:fld>
             <a:endParaRPr lang="en-US"/>
           </a:p>
@@ -7013,7 +7043,7 @@
           <a:p>
             <a:fld id="{0D3616D0-8311-4107-9726-6B805E7D05BA}" type="datetime1">
               <a:rPr lang="en-US" smtClean="0"/>
-              <a:t>9/13/2022</a:t>
+              <a:t>9/17/2022</a:t>
             </a:fld>
             <a:endParaRPr lang="en-US"/>
           </a:p>
@@ -7221,7 +7251,7 @@
           <a:p>
             <a:fld id="{3BC2557A-5C88-417A-A763-5AC779462A5F}" type="datetime1">
               <a:rPr lang="en-US" smtClean="0"/>
-              <a:t>9/13/2022</a:t>
+              <a:t>9/17/2022</a:t>
             </a:fld>
             <a:endParaRPr lang="en-US"/>
           </a:p>
@@ -7745,7 +7775,7 @@
           <a:p>
             <a:fld id="{07C7BFD4-467E-4EDE-93EA-052F5B39A4E5}" type="datetime1">
               <a:rPr lang="en-US" smtClean="0"/>
-              <a:t>9/13/2022</a:t>
+              <a:t>9/17/2022</a:t>
             </a:fld>
             <a:endParaRPr lang="en-US"/>
           </a:p>
@@ -7995,7 +8025,7 @@
           <a:p>
             <a:fld id="{07C7BFD4-467E-4EDE-93EA-052F5B39A4E5}" type="datetime1">
               <a:rPr lang="en-US" smtClean="0"/>
-              <a:t>9/13/2022</a:t>
+              <a:t>9/17/2022</a:t>
             </a:fld>
             <a:endParaRPr lang="en-US"/>
           </a:p>
@@ -8177,7 +8207,7 @@
           <a:p>
             <a:fld id="{109E55A0-C911-4F03-82FC-7E5926047D46}" type="datetime1">
               <a:rPr lang="en-US" smtClean="0"/>
-              <a:t>9/13/2022</a:t>
+              <a:t>9/17/2022</a:t>
             </a:fld>
             <a:endParaRPr lang="en-US"/>
           </a:p>
@@ -8490,7 +8520,7 @@
           <a:p>
             <a:fld id="{A533CBE2-D5BE-47AC-ADC2-9CDFC1D0CF90}" type="datetime1">
               <a:rPr lang="en-US" smtClean="0"/>
-              <a:t>9/13/2022</a:t>
+              <a:t>9/17/2022</a:t>
             </a:fld>
             <a:endParaRPr lang="en-US"/>
           </a:p>
@@ -8791,7 +8821,7 @@
           <a:p>
             <a:fld id="{39B7EDB1-CE74-4951-85A2-0B01C2128E28}" type="datetime1">
               <a:rPr lang="en-US" smtClean="0"/>
-              <a:t>9/13/2022</a:t>
+              <a:t>9/17/2022</a:t>
             </a:fld>
             <a:endParaRPr lang="en-US"/>
           </a:p>
@@ -9239,7 +9269,7 @@
           <a:p>
             <a:fld id="{2BC7EB92-A5C2-4807-A9DC-9EDE6CBFB241}" type="datetime1">
               <a:rPr lang="en-US" smtClean="0"/>
-              <a:t>9/13/2022</a:t>
+              <a:t>9/17/2022</a:t>
             </a:fld>
             <a:endParaRPr lang="en-US"/>
           </a:p>
@@ -9352,7 +9382,7 @@
           <a:p>
             <a:fld id="{2B7B7EE0-7771-4CD5-9B2B-3550753A54A1}" type="datetime1">
               <a:rPr lang="en-US" smtClean="0"/>
-              <a:t>9/13/2022</a:t>
+              <a:t>9/17/2022</a:t>
             </a:fld>
             <a:endParaRPr lang="en-US"/>
           </a:p>
@@ -9663,7 +9693,7 @@
           <a:p>
             <a:fld id="{F8B318B3-0E87-4416-A9B8-D891968C2727}" type="datetime1">
               <a:rPr lang="en-US" smtClean="0"/>
-              <a:t>9/13/2022</a:t>
+              <a:t>9/17/2022</a:t>
             </a:fld>
             <a:endParaRPr lang="en-US"/>
           </a:p>
@@ -9904,7 +9934,7 @@
           <a:p>
             <a:fld id="{54D997E8-DDEE-43F1-8D9B-F8A1E11DE488}" type="datetime1">
               <a:rPr lang="en-US" smtClean="0"/>
-              <a:t>9/13/2022</a:t>
+              <a:t>9/17/2022</a:t>
             </a:fld>
             <a:endParaRPr lang="en-US"/>
           </a:p>
@@ -27003,7 +27033,7 @@
                 <a:effectLst/>
                 <a:latin typeface="Consolas" panose="020B0609020204030204" pitchFamily="49" charset="0"/>
               </a:rPr>
-              <a:t>ObservedClock</a:t>
+              <a:t>ProducerClock</a:t>
             </a:r>
             <a:r>
               <a:rPr lang="en-US" b="0" dirty="0">
@@ -27691,7 +27721,7 @@
                 <a:effectLst/>
                 <a:latin typeface="Consolas" panose="020B0609020204030204" pitchFamily="49" charset="0"/>
               </a:rPr>
-              <a:t>ObservedClock</a:t>
+              <a:t>ProducerClock</a:t>
             </a:r>
             <a:r>
               <a:rPr lang="en-US" b="0" dirty="0">
@@ -29905,7 +29935,7 @@
                 <a:effectLst/>
                 <a:latin typeface="Consolas" panose="020B0609020204030204" pitchFamily="49" charset="0"/>
               </a:rPr>
-              <a:t>ObservedClock</a:t>
+              <a:t>ProducerClock</a:t>
             </a:r>
             <a:r>
               <a:rPr lang="en-US" sz="2000" b="0" dirty="0">

</xml_diff>